<commit_message>
added titering protocol, further edits
</commit_message>
<xml_diff>
--- a/figures/placeholder_neuts.pptx
+++ b/figures/placeholder_neuts.pptx
@@ -104,6 +104,11 @@
       </a:defRPr>
     </a:lvl9pPr>
   </p:defaultTextStyle>
+  <p:extLst>
+    <p:ext uri="{EFAFB233-063F-42B5-8137-9DF3F51BA10A}">
+      <p15:sldGuideLst xmlns:p15="http://schemas.microsoft.com/office/powerpoint/2012/main"/>
+    </p:ext>
+  </p:extLst>
 </p:presentation>
 </file>
 
@@ -254,7 +259,7 @@
           <a:p>
             <a:fld id="{AB667D60-C70F-8545-8032-B49411841C93}" type="datetimeFigureOut">
               <a:rPr lang="en-US" smtClean="0"/>
-              <a:t>4/15/20</a:t>
+              <a:t>4/16/20</a:t>
             </a:fld>
             <a:endParaRPr lang="en-US"/>
           </a:p>
@@ -452,7 +457,7 @@
           <a:p>
             <a:fld id="{AB667D60-C70F-8545-8032-B49411841C93}" type="datetimeFigureOut">
               <a:rPr lang="en-US" smtClean="0"/>
-              <a:t>4/15/20</a:t>
+              <a:t>4/16/20</a:t>
             </a:fld>
             <a:endParaRPr lang="en-US"/>
           </a:p>
@@ -660,7 +665,7 @@
           <a:p>
             <a:fld id="{AB667D60-C70F-8545-8032-B49411841C93}" type="datetimeFigureOut">
               <a:rPr lang="en-US" smtClean="0"/>
-              <a:t>4/15/20</a:t>
+              <a:t>4/16/20</a:t>
             </a:fld>
             <a:endParaRPr lang="en-US"/>
           </a:p>
@@ -858,7 +863,7 @@
           <a:p>
             <a:fld id="{AB667D60-C70F-8545-8032-B49411841C93}" type="datetimeFigureOut">
               <a:rPr lang="en-US" smtClean="0"/>
-              <a:t>4/15/20</a:t>
+              <a:t>4/16/20</a:t>
             </a:fld>
             <a:endParaRPr lang="en-US"/>
           </a:p>
@@ -1133,7 +1138,7 @@
           <a:p>
             <a:fld id="{AB667D60-C70F-8545-8032-B49411841C93}" type="datetimeFigureOut">
               <a:rPr lang="en-US" smtClean="0"/>
-              <a:t>4/15/20</a:t>
+              <a:t>4/16/20</a:t>
             </a:fld>
             <a:endParaRPr lang="en-US"/>
           </a:p>
@@ -1398,7 +1403,7 @@
           <a:p>
             <a:fld id="{AB667D60-C70F-8545-8032-B49411841C93}" type="datetimeFigureOut">
               <a:rPr lang="en-US" smtClean="0"/>
-              <a:t>4/15/20</a:t>
+              <a:t>4/16/20</a:t>
             </a:fld>
             <a:endParaRPr lang="en-US"/>
           </a:p>
@@ -1810,7 +1815,7 @@
           <a:p>
             <a:fld id="{AB667D60-C70F-8545-8032-B49411841C93}" type="datetimeFigureOut">
               <a:rPr lang="en-US" smtClean="0"/>
-              <a:t>4/15/20</a:t>
+              <a:t>4/16/20</a:t>
             </a:fld>
             <a:endParaRPr lang="en-US"/>
           </a:p>
@@ -1951,7 +1956,7 @@
           <a:p>
             <a:fld id="{AB667D60-C70F-8545-8032-B49411841C93}" type="datetimeFigureOut">
               <a:rPr lang="en-US" smtClean="0"/>
-              <a:t>4/15/20</a:t>
+              <a:t>4/16/20</a:t>
             </a:fld>
             <a:endParaRPr lang="en-US"/>
           </a:p>
@@ -2064,7 +2069,7 @@
           <a:p>
             <a:fld id="{AB667D60-C70F-8545-8032-B49411841C93}" type="datetimeFigureOut">
               <a:rPr lang="en-US" smtClean="0"/>
-              <a:t>4/15/20</a:t>
+              <a:t>4/16/20</a:t>
             </a:fld>
             <a:endParaRPr lang="en-US"/>
           </a:p>
@@ -2375,7 +2380,7 @@
           <a:p>
             <a:fld id="{AB667D60-C70F-8545-8032-B49411841C93}" type="datetimeFigureOut">
               <a:rPr lang="en-US" smtClean="0"/>
-              <a:t>4/15/20</a:t>
+              <a:t>4/16/20</a:t>
             </a:fld>
             <a:endParaRPr lang="en-US"/>
           </a:p>
@@ -2663,7 +2668,7 @@
           <a:p>
             <a:fld id="{AB667D60-C70F-8545-8032-B49411841C93}" type="datetimeFigureOut">
               <a:rPr lang="en-US" smtClean="0"/>
-              <a:t>4/15/20</a:t>
+              <a:t>4/16/20</a:t>
             </a:fld>
             <a:endParaRPr lang="en-US"/>
           </a:p>
@@ -2904,7 +2909,7 @@
           <a:p>
             <a:fld id="{AB667D60-C70F-8545-8032-B49411841C93}" type="datetimeFigureOut">
               <a:rPr lang="en-US" smtClean="0"/>
-              <a:t>4/15/20</a:t>
+              <a:t>4/16/20</a:t>
             </a:fld>
             <a:endParaRPr lang="en-US"/>
           </a:p>
@@ -3323,10 +3328,10 @@
       </p:grpSpPr>
       <p:grpSp>
         <p:nvGrpSpPr>
-          <p:cNvPr id="8" name="Group 7">
-            <a:extLst>
-              <a:ext uri="{FF2B5EF4-FFF2-40B4-BE49-F238E27FC236}">
-                <a16:creationId xmlns:a16="http://schemas.microsoft.com/office/drawing/2014/main" id="{CE79EC8A-36BF-B948-A02A-EAC8F7E72B3A}"/>
+          <p:cNvPr id="17" name="Group 16">
+            <a:extLst>
+              <a:ext uri="{FF2B5EF4-FFF2-40B4-BE49-F238E27FC236}">
+                <a16:creationId xmlns:a16="http://schemas.microsoft.com/office/drawing/2014/main" id="{A26CEC66-36A6-9A48-B30E-3682F2806F2D}"/>
               </a:ext>
             </a:extLst>
           </p:cNvPr>
@@ -3335,10 +3340,10 @@
         </p:nvGrpSpPr>
         <p:grpSpPr>
           <a:xfrm>
-            <a:off x="81369" y="773554"/>
-            <a:ext cx="12000264" cy="3290446"/>
-            <a:chOff x="81369" y="773554"/>
-            <a:chExt cx="12000264" cy="3290446"/>
+            <a:off x="153374" y="153068"/>
+            <a:ext cx="12192000" cy="6288504"/>
+            <a:chOff x="153374" y="153068"/>
+            <a:chExt cx="12192000" cy="6288504"/>
           </a:xfrm>
         </p:grpSpPr>
         <p:pic>
@@ -3363,7 +3368,7 @@
           </p:blipFill>
           <p:spPr>
             <a:xfrm>
-              <a:off x="6359451" y="1065942"/>
+              <a:off x="6623192" y="3443514"/>
               <a:ext cx="5722182" cy="2998058"/>
             </a:xfrm>
             <a:prstGeom prst="rect">
@@ -3393,7 +3398,7 @@
           </p:blipFill>
           <p:spPr>
             <a:xfrm>
-              <a:off x="373818" y="1065942"/>
+              <a:off x="6623192" y="445456"/>
               <a:ext cx="5722182" cy="2998058"/>
             </a:xfrm>
             <a:prstGeom prst="rect">
@@ -3415,7 +3420,7 @@
           </p:nvSpPr>
           <p:spPr>
             <a:xfrm>
-              <a:off x="81369" y="773554"/>
+              <a:off x="153374" y="153068"/>
               <a:ext cx="433132" cy="584775"/>
             </a:xfrm>
             <a:prstGeom prst="rect">
@@ -3450,7 +3455,7 @@
           </p:nvSpPr>
           <p:spPr>
             <a:xfrm>
-              <a:off x="5885338" y="773554"/>
+              <a:off x="6172048" y="153068"/>
               <a:ext cx="415498" cy="584775"/>
             </a:xfrm>
             <a:prstGeom prst="rect">
@@ -3471,6 +3476,71 @@
             </a:p>
           </p:txBody>
         </p:sp>
+        <p:sp>
+          <p:nvSpPr>
+            <p:cNvPr id="12" name="TextBox 11">
+              <a:extLst>
+                <a:ext uri="{FF2B5EF4-FFF2-40B4-BE49-F238E27FC236}">
+                  <a16:creationId xmlns:a16="http://schemas.microsoft.com/office/drawing/2014/main" id="{983E5833-CC73-3F43-8AAF-680BC500BE4A}"/>
+                </a:ext>
+              </a:extLst>
+            </p:cNvPr>
+            <p:cNvSpPr txBox="1"/>
+            <p:nvPr/>
+          </p:nvSpPr>
+          <p:spPr>
+            <a:xfrm>
+              <a:off x="6048037" y="3136612"/>
+              <a:ext cx="402674" cy="584775"/>
+            </a:xfrm>
+            <a:prstGeom prst="rect">
+              <a:avLst/>
+            </a:prstGeom>
+            <a:noFill/>
+          </p:spPr>
+          <p:txBody>
+            <a:bodyPr wrap="none" rtlCol="0">
+              <a:spAutoFit/>
+            </a:bodyPr>
+            <a:lstStyle/>
+            <a:p>
+              <a:r>
+                <a:rPr lang="en-US" sz="3200" b="1" dirty="0"/>
+                <a:t>C</a:t>
+              </a:r>
+            </a:p>
+          </p:txBody>
+        </p:sp>
+        <p:pic>
+          <p:nvPicPr>
+            <p:cNvPr id="16" name="Picture 15" descr="A picture containing building&#10;&#10;Description automatically generated">
+              <a:extLst>
+                <a:ext uri="{FF2B5EF4-FFF2-40B4-BE49-F238E27FC236}">
+                  <a16:creationId xmlns:a16="http://schemas.microsoft.com/office/drawing/2014/main" id="{715B303D-893A-EE49-8819-8BE8C1CC3866}"/>
+                </a:ext>
+              </a:extLst>
+            </p:cNvPr>
+            <p:cNvPicPr>
+              <a:picLocks noChangeAspect="1"/>
+            </p:cNvPicPr>
+            <p:nvPr/>
+          </p:nvPicPr>
+          <p:blipFill>
+            <a:blip r:embed="rId4"/>
+            <a:stretch>
+              <a:fillRect/>
+            </a:stretch>
+          </p:blipFill>
+          <p:spPr>
+            <a:xfrm>
+              <a:off x="505716" y="737843"/>
+              <a:ext cx="5499100" cy="4876800"/>
+            </a:xfrm>
+            <a:prstGeom prst="rect">
+              <a:avLst/>
+            </a:prstGeom>
+          </p:spPr>
+        </p:pic>
       </p:grpSp>
     </p:spTree>
     <p:extLst>

</xml_diff>